<commit_message>
Updating TinyURL discussion for System design learning. In progress.
</commit_message>
<xml_diff>
--- a/TinyUrl_discussion_Level01.pptx
+++ b/TinyUrl_discussion_Level01.pptx
@@ -3427,7 +3427,7 @@
         <p:spPr>
           <a:xfrm>
             <a:off x="213645" y="803305"/>
-            <a:ext cx="5007835" cy="4970591"/>
+            <a:ext cx="5358213" cy="4016484"/>
           </a:xfrm>
           <a:prstGeom prst="rect">
             <a:avLst/>
@@ -3461,6 +3461,15 @@
             </a:r>
           </a:p>
           <a:p>
+            <a:r>
+              <a:rPr lang="en-IN" sz="1000" dirty="0">
+                <a:latin typeface="Century Gothic" panose="020B0502020202020204" pitchFamily="34" charset="0"/>
+                <a:cs typeface="Biome" panose="020B0502040204020203" pitchFamily="34" charset="0"/>
+              </a:rPr>
+              <a:t>First step is to understand the requirement and goal of the system.</a:t>
+            </a:r>
+          </a:p>
+          <a:p>
             <a:endParaRPr lang="en-IN" sz="1000" dirty="0">
               <a:latin typeface="Century Gothic" panose="020B0502020202020204" pitchFamily="34" charset="0"/>
               <a:cs typeface="Biome" panose="020B0502040204020203" pitchFamily="34" charset="0"/>
@@ -3472,7 +3481,7 @@
                 <a:latin typeface="Century Gothic" panose="020B0502020202020204" pitchFamily="34" charset="0"/>
                 <a:cs typeface="Biome" panose="020B0502040204020203" pitchFamily="34" charset="0"/>
               </a:rPr>
-              <a:t>First step is to understand the requirement and goal of the system.</a:t>
+              <a:t>You should always clarify the requirement in very beginning of your discussion. It helps to start building the ladder between you and your audience.</a:t>
             </a:r>
           </a:p>
           <a:p>
@@ -3487,29 +3496,8 @@
                 <a:latin typeface="Century Gothic" panose="020B0502020202020204" pitchFamily="34" charset="0"/>
                 <a:cs typeface="Biome" panose="020B0502040204020203" pitchFamily="34" charset="0"/>
               </a:rPr>
-              <a:t>You should always clarify the requirement in very beginning of your discussion. It helps to start building the ladder between you and your audience.</a:t>
-            </a:r>
-          </a:p>
-          <a:p>
-            <a:endParaRPr lang="en-IN" sz="1000" dirty="0">
-              <a:latin typeface="Century Gothic" panose="020B0502020202020204" pitchFamily="34" charset="0"/>
-              <a:cs typeface="Biome" panose="020B0502040204020203" pitchFamily="34" charset="0"/>
-            </a:endParaRPr>
-          </a:p>
-          <a:p>
-            <a:r>
-              <a:rPr lang="en-IN" sz="1000" dirty="0">
-                <a:latin typeface="Century Gothic" panose="020B0502020202020204" pitchFamily="34" charset="0"/>
-                <a:cs typeface="Biome" panose="020B0502040204020203" pitchFamily="34" charset="0"/>
-              </a:rPr>
               <a:t>So, after discussion you will finalize the requirement and goal of the system. Let’s put it down in 03 different category ( FR, NFR, Extended requirement )</a:t>
             </a:r>
-          </a:p>
-          <a:p>
-            <a:endParaRPr lang="en-IN" sz="1000" dirty="0">
-              <a:latin typeface="Century Gothic" panose="020B0502020202020204" pitchFamily="34" charset="0"/>
-              <a:cs typeface="Biome" panose="020B0502040204020203" pitchFamily="34" charset="0"/>
-            </a:endParaRPr>
           </a:p>
           <a:p>
             <a:r>
@@ -3582,16 +3570,6 @@
             </a:r>
           </a:p>
           <a:p>
-            <a:pPr marL="171450" indent="-171450">
-              <a:buFont typeface="Wingdings" panose="05000000000000000000" pitchFamily="2" charset="2"/>
-              <a:buChar char="ü"/>
-            </a:pPr>
-            <a:endParaRPr lang="en-US" sz="1000" dirty="0">
-              <a:latin typeface="Century Gothic" panose="020B0502020202020204" pitchFamily="34" charset="0"/>
-              <a:cs typeface="Biome" panose="020B0502040204020203" pitchFamily="34" charset="0"/>
-            </a:endParaRPr>
-          </a:p>
-          <a:p>
             <a:r>
               <a:rPr lang="en-IN" sz="1100" b="1" dirty="0">
                 <a:latin typeface="Century Gothic" panose="020B0502020202020204" pitchFamily="34" charset="0"/>
@@ -3661,22 +3639,6 @@
             </a:r>
           </a:p>
           <a:p>
-            <a:pPr marL="171450" indent="-171450">
-              <a:buFont typeface="Wingdings" panose="05000000000000000000" pitchFamily="2" charset="2"/>
-              <a:buChar char="§"/>
-            </a:pPr>
-            <a:endParaRPr lang="en-IN" sz="1000" dirty="0">
-              <a:latin typeface="Century Gothic" panose="020B0502020202020204" pitchFamily="34" charset="0"/>
-              <a:cs typeface="Biome" panose="020B0502040204020203" pitchFamily="34" charset="0"/>
-            </a:endParaRPr>
-          </a:p>
-          <a:p>
-            <a:endParaRPr lang="en-IN" sz="1000" b="1" dirty="0">
-              <a:latin typeface="Century Gothic" panose="020B0502020202020204" pitchFamily="34" charset="0"/>
-              <a:cs typeface="Biome" panose="020B0502040204020203" pitchFamily="34" charset="0"/>
-            </a:endParaRPr>
-          </a:p>
-          <a:p>
             <a:r>
               <a:rPr lang="en-IN" sz="1100" b="1" dirty="0">
                 <a:latin typeface="Century Gothic" panose="020B0502020202020204" pitchFamily="34" charset="0"/>
@@ -3724,18 +3686,6 @@
               </a:rPr>
               <a:t>should expose as rest webservice api </a:t>
             </a:r>
-            <a:endParaRPr lang="en-IN" sz="1000" b="1" dirty="0">
-              <a:latin typeface="Century Gothic" panose="020B0502020202020204" pitchFamily="34" charset="0"/>
-              <a:cs typeface="Biome" panose="020B0502040204020203" pitchFamily="34" charset="0"/>
-            </a:endParaRPr>
-          </a:p>
-          <a:p>
-            <a:endParaRPr lang="en-IN" sz="1000" dirty="0">
-              <a:latin typeface="Century Gothic" panose="020B0502020202020204" pitchFamily="34" charset="0"/>
-              <a:cs typeface="Biome" panose="020B0502040204020203" pitchFamily="34" charset="0"/>
-            </a:endParaRPr>
-          </a:p>
-          <a:p>
             <a:endParaRPr lang="en-IN" sz="1200" dirty="0">
               <a:latin typeface="Biome" panose="020B0502040204020203" pitchFamily="34" charset="0"/>
               <a:cs typeface="Biome" panose="020B0502040204020203" pitchFamily="34" charset="0"/>
@@ -3757,8 +3707,8 @@
         </p:nvSpPr>
         <p:spPr>
           <a:xfrm>
-            <a:off x="5409489" y="803305"/>
-            <a:ext cx="6568866" cy="5878532"/>
+            <a:off x="5759289" y="803305"/>
+            <a:ext cx="6219066" cy="5878532"/>
           </a:xfrm>
           <a:prstGeom prst="rect">
             <a:avLst/>
@@ -4102,8 +4052,8 @@
         </p:nvSpPr>
         <p:spPr>
           <a:xfrm>
-            <a:off x="142875" y="803305"/>
-            <a:ext cx="5146972" cy="5797520"/>
+            <a:off x="142874" y="803305"/>
+            <a:ext cx="5518359" cy="5976982"/>
           </a:xfrm>
           <a:prstGeom prst="rect">
             <a:avLst/>
@@ -4156,8 +4106,8 @@
         </p:nvSpPr>
         <p:spPr>
           <a:xfrm>
-            <a:off x="5381625" y="812830"/>
-            <a:ext cx="6568866" cy="5797520"/>
+            <a:off x="5731423" y="812830"/>
+            <a:ext cx="6219067" cy="5797520"/>
           </a:xfrm>
           <a:prstGeom prst="rect">
             <a:avLst/>
@@ -4284,6 +4234,372 @@
                 </a:highlight>
               </a:rPr>
               <a:t>** Level 01 – Professional : Expect discussion at justifying your all decision with why?</a:t>
+            </a:r>
+          </a:p>
+        </p:txBody>
+      </p:sp>
+      <p:pic>
+        <p:nvPicPr>
+          <p:cNvPr id="9" name="Picture 8">
+            <a:extLst>
+              <a:ext uri="{FF2B5EF4-FFF2-40B4-BE49-F238E27FC236}">
+                <a16:creationId xmlns:a16="http://schemas.microsoft.com/office/drawing/2014/main" id="{8D98DB01-985F-476E-BF74-26655CEF76E5}"/>
+              </a:ext>
+            </a:extLst>
+          </p:cNvPr>
+          <p:cNvPicPr>
+            <a:picLocks noChangeAspect="1"/>
+          </p:cNvPicPr>
+          <p:nvPr/>
+        </p:nvPicPr>
+        <p:blipFill>
+          <a:blip r:embed="rId2"/>
+          <a:stretch>
+            <a:fillRect/>
+          </a:stretch>
+        </p:blipFill>
+        <p:spPr>
+          <a:xfrm>
+            <a:off x="355818" y="4686715"/>
+            <a:ext cx="4556365" cy="1991023"/>
+          </a:xfrm>
+          <a:prstGeom prst="rect">
+            <a:avLst/>
+          </a:prstGeom>
+        </p:spPr>
+      </p:pic>
+      <p:sp>
+        <p:nvSpPr>
+          <p:cNvPr id="11" name="Rectangle 10">
+            <a:extLst>
+              <a:ext uri="{FF2B5EF4-FFF2-40B4-BE49-F238E27FC236}">
+                <a16:creationId xmlns:a16="http://schemas.microsoft.com/office/drawing/2014/main" id="{94DEF69F-F13E-482C-A43C-7388D990E5EF}"/>
+              </a:ext>
+            </a:extLst>
+          </p:cNvPr>
+          <p:cNvSpPr/>
+          <p:nvPr/>
+        </p:nvSpPr>
+        <p:spPr>
+          <a:xfrm>
+            <a:off x="344059" y="4686715"/>
+            <a:ext cx="4578319" cy="1991023"/>
+          </a:xfrm>
+          <a:prstGeom prst="rect">
+            <a:avLst/>
+          </a:prstGeom>
+          <a:noFill/>
+          <a:ln w="9525" cap="flat" cmpd="sng" algn="ctr">
+            <a:solidFill>
+              <a:schemeClr val="accent3"/>
+            </a:solidFill>
+            <a:prstDash val="solid"/>
+            <a:round/>
+            <a:headEnd type="none" w="med" len="med"/>
+            <a:tailEnd type="none" w="med" len="med"/>
+          </a:ln>
+        </p:spPr>
+        <p:style>
+          <a:lnRef idx="0">
+            <a:scrgbClr r="0" g="0" b="0"/>
+          </a:lnRef>
+          <a:fillRef idx="0">
+            <a:scrgbClr r="0" g="0" b="0"/>
+          </a:fillRef>
+          <a:effectRef idx="0">
+            <a:scrgbClr r="0" g="0" b="0"/>
+          </a:effectRef>
+          <a:fontRef idx="minor">
+            <a:schemeClr val="accent3"/>
+          </a:fontRef>
+        </p:style>
+        <p:txBody>
+          <a:bodyPr rtlCol="0" anchor="ctr"/>
+          <a:lstStyle/>
+          <a:p>
+            <a:pPr algn="ctr"/>
+            <a:endParaRPr lang="en-IN" dirty="0"/>
+          </a:p>
+        </p:txBody>
+      </p:sp>
+      <p:sp>
+        <p:nvSpPr>
+          <p:cNvPr id="12" name="Oval 11">
+            <a:extLst>
+              <a:ext uri="{FF2B5EF4-FFF2-40B4-BE49-F238E27FC236}">
+                <a16:creationId xmlns:a16="http://schemas.microsoft.com/office/drawing/2014/main" id="{419C2237-57C1-4537-9B8C-8D7DF2D2454E}"/>
+              </a:ext>
+            </a:extLst>
+          </p:cNvPr>
+          <p:cNvSpPr/>
+          <p:nvPr/>
+        </p:nvSpPr>
+        <p:spPr>
+          <a:xfrm>
+            <a:off x="1250066" y="4763627"/>
+            <a:ext cx="222948" cy="203098"/>
+          </a:xfrm>
+          <a:prstGeom prst="ellipse">
+            <a:avLst/>
+          </a:prstGeom>
+        </p:spPr>
+        <p:style>
+          <a:lnRef idx="0">
+            <a:schemeClr val="accent5"/>
+          </a:lnRef>
+          <a:fillRef idx="3">
+            <a:schemeClr val="accent5"/>
+          </a:fillRef>
+          <a:effectRef idx="3">
+            <a:schemeClr val="accent5"/>
+          </a:effectRef>
+          <a:fontRef idx="minor">
+            <a:schemeClr val="lt1"/>
+          </a:fontRef>
+        </p:style>
+        <p:txBody>
+          <a:bodyPr rtlCol="0" anchor="ctr"/>
+          <a:lstStyle/>
+          <a:p>
+            <a:pPr algn="ctr"/>
+            <a:r>
+              <a:rPr lang="en-IN" sz="1600" dirty="0"/>
+              <a:t>1</a:t>
+            </a:r>
+          </a:p>
+        </p:txBody>
+      </p:sp>
+      <p:sp>
+        <p:nvSpPr>
+          <p:cNvPr id="13" name="Oval 12">
+            <a:extLst>
+              <a:ext uri="{FF2B5EF4-FFF2-40B4-BE49-F238E27FC236}">
+                <a16:creationId xmlns:a16="http://schemas.microsoft.com/office/drawing/2014/main" id="{59EC4BE1-64BA-48A1-8B5F-514878C9A1E4}"/>
+              </a:ext>
+            </a:extLst>
+          </p:cNvPr>
+          <p:cNvSpPr/>
+          <p:nvPr/>
+        </p:nvSpPr>
+        <p:spPr>
+          <a:xfrm>
+            <a:off x="3352815" y="4763627"/>
+            <a:ext cx="222948" cy="203098"/>
+          </a:xfrm>
+          <a:prstGeom prst="ellipse">
+            <a:avLst/>
+          </a:prstGeom>
+        </p:spPr>
+        <p:style>
+          <a:lnRef idx="0">
+            <a:schemeClr val="accent5"/>
+          </a:lnRef>
+          <a:fillRef idx="3">
+            <a:schemeClr val="accent5"/>
+          </a:fillRef>
+          <a:effectRef idx="3">
+            <a:schemeClr val="accent5"/>
+          </a:effectRef>
+          <a:fontRef idx="minor">
+            <a:schemeClr val="lt1"/>
+          </a:fontRef>
+        </p:style>
+        <p:txBody>
+          <a:bodyPr rtlCol="0" anchor="ctr"/>
+          <a:lstStyle/>
+          <a:p>
+            <a:pPr algn="ctr"/>
+            <a:r>
+              <a:rPr lang="en-IN" sz="1600" dirty="0"/>
+              <a:t>2</a:t>
+            </a:r>
+          </a:p>
+        </p:txBody>
+      </p:sp>
+      <p:sp>
+        <p:nvSpPr>
+          <p:cNvPr id="14" name="Oval 13">
+            <a:extLst>
+              <a:ext uri="{FF2B5EF4-FFF2-40B4-BE49-F238E27FC236}">
+                <a16:creationId xmlns:a16="http://schemas.microsoft.com/office/drawing/2014/main" id="{B50C4CF6-8B4F-4435-8F88-02A2994E6509}"/>
+              </a:ext>
+            </a:extLst>
+          </p:cNvPr>
+          <p:cNvSpPr/>
+          <p:nvPr/>
+        </p:nvSpPr>
+        <p:spPr>
+          <a:xfrm>
+            <a:off x="3027970" y="5349977"/>
+            <a:ext cx="222948" cy="203098"/>
+          </a:xfrm>
+          <a:prstGeom prst="ellipse">
+            <a:avLst/>
+          </a:prstGeom>
+        </p:spPr>
+        <p:style>
+          <a:lnRef idx="0">
+            <a:schemeClr val="accent5"/>
+          </a:lnRef>
+          <a:fillRef idx="3">
+            <a:schemeClr val="accent5"/>
+          </a:fillRef>
+          <a:effectRef idx="3">
+            <a:schemeClr val="accent5"/>
+          </a:effectRef>
+          <a:fontRef idx="minor">
+            <a:schemeClr val="lt1"/>
+          </a:fontRef>
+        </p:style>
+        <p:txBody>
+          <a:bodyPr rtlCol="0" anchor="ctr"/>
+          <a:lstStyle/>
+          <a:p>
+            <a:pPr algn="ctr"/>
+            <a:r>
+              <a:rPr lang="en-IN" sz="1600" dirty="0"/>
+              <a:t>3</a:t>
+            </a:r>
+          </a:p>
+        </p:txBody>
+      </p:sp>
+      <p:sp>
+        <p:nvSpPr>
+          <p:cNvPr id="15" name="Oval 14">
+            <a:extLst>
+              <a:ext uri="{FF2B5EF4-FFF2-40B4-BE49-F238E27FC236}">
+                <a16:creationId xmlns:a16="http://schemas.microsoft.com/office/drawing/2014/main" id="{54FAAA6B-605A-4812-805A-A41D6D931A7E}"/>
+              </a:ext>
+            </a:extLst>
+          </p:cNvPr>
+          <p:cNvSpPr/>
+          <p:nvPr/>
+        </p:nvSpPr>
+        <p:spPr>
+          <a:xfrm>
+            <a:off x="3889776" y="5647214"/>
+            <a:ext cx="222948" cy="203098"/>
+          </a:xfrm>
+          <a:prstGeom prst="ellipse">
+            <a:avLst/>
+          </a:prstGeom>
+        </p:spPr>
+        <p:style>
+          <a:lnRef idx="0">
+            <a:schemeClr val="accent5"/>
+          </a:lnRef>
+          <a:fillRef idx="3">
+            <a:schemeClr val="accent5"/>
+          </a:fillRef>
+          <a:effectRef idx="3">
+            <a:schemeClr val="accent5"/>
+          </a:effectRef>
+          <a:fontRef idx="minor">
+            <a:schemeClr val="lt1"/>
+          </a:fontRef>
+        </p:style>
+        <p:txBody>
+          <a:bodyPr rtlCol="0" anchor="ctr"/>
+          <a:lstStyle/>
+          <a:p>
+            <a:pPr algn="ctr"/>
+            <a:r>
+              <a:rPr lang="en-IN" sz="1600" dirty="0"/>
+              <a:t>4</a:t>
+            </a:r>
+          </a:p>
+        </p:txBody>
+      </p:sp>
+      <p:sp>
+        <p:nvSpPr>
+          <p:cNvPr id="19" name="Oval 18">
+            <a:extLst>
+              <a:ext uri="{FF2B5EF4-FFF2-40B4-BE49-F238E27FC236}">
+                <a16:creationId xmlns:a16="http://schemas.microsoft.com/office/drawing/2014/main" id="{F2CEAFAB-BB28-4C71-BC66-F6A52E19C580}"/>
+              </a:ext>
+            </a:extLst>
+          </p:cNvPr>
+          <p:cNvSpPr/>
+          <p:nvPr/>
+        </p:nvSpPr>
+        <p:spPr>
+          <a:xfrm>
+            <a:off x="2197338" y="5647214"/>
+            <a:ext cx="222948" cy="203098"/>
+          </a:xfrm>
+          <a:prstGeom prst="ellipse">
+            <a:avLst/>
+          </a:prstGeom>
+        </p:spPr>
+        <p:style>
+          <a:lnRef idx="0">
+            <a:schemeClr val="accent5"/>
+          </a:lnRef>
+          <a:fillRef idx="3">
+            <a:schemeClr val="accent5"/>
+          </a:fillRef>
+          <a:effectRef idx="3">
+            <a:schemeClr val="accent5"/>
+          </a:effectRef>
+          <a:fontRef idx="minor">
+            <a:schemeClr val="lt1"/>
+          </a:fontRef>
+        </p:style>
+        <p:txBody>
+          <a:bodyPr rtlCol="0" anchor="ctr"/>
+          <a:lstStyle/>
+          <a:p>
+            <a:pPr algn="ctr"/>
+            <a:r>
+              <a:rPr lang="en-IN" sz="1600" dirty="0"/>
+              <a:t>5</a:t>
+            </a:r>
+          </a:p>
+        </p:txBody>
+      </p:sp>
+      <p:sp>
+        <p:nvSpPr>
+          <p:cNvPr id="20" name="Oval 19">
+            <a:extLst>
+              <a:ext uri="{FF2B5EF4-FFF2-40B4-BE49-F238E27FC236}">
+                <a16:creationId xmlns:a16="http://schemas.microsoft.com/office/drawing/2014/main" id="{DB916E14-47B1-4F0A-AB6F-3B52D32260EE}"/>
+              </a:ext>
+            </a:extLst>
+          </p:cNvPr>
+          <p:cNvSpPr/>
+          <p:nvPr/>
+        </p:nvSpPr>
+        <p:spPr>
+          <a:xfrm>
+            <a:off x="1263226" y="5349977"/>
+            <a:ext cx="222948" cy="203098"/>
+          </a:xfrm>
+          <a:prstGeom prst="ellipse">
+            <a:avLst/>
+          </a:prstGeom>
+        </p:spPr>
+        <p:style>
+          <a:lnRef idx="0">
+            <a:schemeClr val="accent5"/>
+          </a:lnRef>
+          <a:fillRef idx="3">
+            <a:schemeClr val="accent5"/>
+          </a:fillRef>
+          <a:effectRef idx="3">
+            <a:schemeClr val="accent5"/>
+          </a:effectRef>
+          <a:fontRef idx="minor">
+            <a:schemeClr val="lt1"/>
+          </a:fontRef>
+        </p:style>
+        <p:txBody>
+          <a:bodyPr rtlCol="0" anchor="ctr"/>
+          <a:lstStyle/>
+          <a:p>
+            <a:pPr algn="ctr"/>
+            <a:r>
+              <a:rPr lang="en-IN" sz="1600" dirty="0"/>
+              <a:t>6</a:t>
             </a:r>
           </a:p>
         </p:txBody>
@@ -6624,7 +6940,7 @@
         <p:spPr>
           <a:xfrm>
             <a:off x="179462" y="871671"/>
-            <a:ext cx="11853017" cy="1231106"/>
+            <a:ext cx="6121130" cy="5463034"/>
           </a:xfrm>
           <a:prstGeom prst="rect">
             <a:avLst/>
@@ -6645,18 +6961,1098 @@
             </a:r>
           </a:p>
           <a:p>
+            <a:endParaRPr lang="en-IN" sz="1000" b="1" dirty="0">
+              <a:latin typeface="Century Gothic" panose="020B0502020202020204" pitchFamily="34" charset="0"/>
+            </a:endParaRPr>
+          </a:p>
+          <a:p>
+            <a:r>
+              <a:rPr lang="en-IN" sz="1000" b="1" dirty="0">
+                <a:highlight>
+                  <a:srgbClr val="FFFF00"/>
+                </a:highlight>
+                <a:latin typeface="Century Gothic" panose="020B0502020202020204" pitchFamily="34" charset="0"/>
+              </a:rPr>
+              <a:t>Problem: How to generate short and unique key for a given URL.</a:t>
+            </a:r>
+          </a:p>
+          <a:p>
+            <a:endParaRPr lang="en-IN" sz="1000" b="1" dirty="0">
+              <a:latin typeface="Century Gothic" panose="020B0502020202020204" pitchFamily="34" charset="0"/>
+            </a:endParaRPr>
+          </a:p>
+          <a:p>
+            <a:r>
+              <a:rPr lang="en-IN" sz="1000" dirty="0">
+                <a:latin typeface="Century Gothic" panose="020B0502020202020204" pitchFamily="34" charset="0"/>
+              </a:rPr>
+              <a:t>Let’s try to understand the exact requirement through one example</a:t>
+            </a:r>
+          </a:p>
+          <a:p>
+            <a:r>
+              <a:rPr lang="en-IN" sz="1000" dirty="0">
+                <a:latin typeface="Century Gothic" panose="020B0502020202020204" pitchFamily="34" charset="0"/>
+                <a:hlinkClick r:id="rId2">
+                  <a:extLst>
+                    <a:ext uri="{A12FA001-AC4F-418D-AE19-62706E023703}">
+                      <ahyp:hlinkClr xmlns:ahyp="http://schemas.microsoft.com/office/drawing/2018/hyperlinkcolor" val="tx"/>
+                    </a:ext>
+                  </a:extLst>
+                </a:hlinkClick>
+              </a:rPr>
+              <a:t>https://tinyurl.com/rxcsyr3r</a:t>
+            </a:r>
+            <a:r>
+              <a:rPr lang="en-IN" sz="1000" dirty="0">
+                <a:latin typeface="Century Gothic" panose="020B0502020202020204" pitchFamily="34" charset="0"/>
+              </a:rPr>
+              <a:t>  in this example last 8 character can be considered as the shortURL or Unique key expected from your system. </a:t>
+            </a:r>
+          </a:p>
+          <a:p>
             <a:endParaRPr lang="en-IN" sz="1000" dirty="0">
               <a:latin typeface="Century Gothic" panose="020B0502020202020204" pitchFamily="34" charset="0"/>
             </a:endParaRPr>
           </a:p>
           <a:p>
+            <a:r>
+              <a:rPr lang="en-IN" sz="1000" dirty="0">
+                <a:latin typeface="Century Gothic" panose="020B0502020202020204" pitchFamily="34" charset="0"/>
+              </a:rPr>
+              <a:t>How to generate these 8 characters based unique key or shortURL?</a:t>
+            </a:r>
+          </a:p>
+          <a:p>
+            <a:r>
+              <a:rPr lang="en-IN" sz="1000" dirty="0">
+                <a:latin typeface="Century Gothic" panose="020B0502020202020204" pitchFamily="34" charset="0"/>
+              </a:rPr>
+              <a:t>There are multiple approach possible to generate these shortURL or unique key.</a:t>
+            </a:r>
+          </a:p>
+          <a:p>
+            <a:r>
+              <a:rPr lang="en-IN" sz="1000" dirty="0">
+                <a:latin typeface="Century Gothic" panose="020B0502020202020204" pitchFamily="34" charset="0"/>
+              </a:rPr>
+              <a:t>Let’s discuss the Approaches one by one and their pros and cons…</a:t>
+            </a:r>
+          </a:p>
+          <a:p>
+            <a:endParaRPr lang="en-IN" sz="1000" dirty="0">
+              <a:latin typeface="Century Gothic" panose="020B0502020202020204" pitchFamily="34" charset="0"/>
+            </a:endParaRPr>
+          </a:p>
+          <a:p>
+            <a:r>
+              <a:rPr lang="en-IN" sz="1000" b="1" dirty="0">
+                <a:latin typeface="Century Gothic" panose="020B0502020202020204" pitchFamily="34" charset="0"/>
+              </a:rPr>
+              <a:t>Approach 01 : </a:t>
+            </a:r>
+            <a:r>
+              <a:rPr lang="en-IN" sz="1000" b="1" dirty="0">
+                <a:solidFill>
+                  <a:srgbClr val="00B0F0"/>
+                </a:solidFill>
+                <a:highlight>
+                  <a:srgbClr val="FFFF00"/>
+                </a:highlight>
+                <a:latin typeface="Century Gothic" panose="020B0502020202020204" pitchFamily="34" charset="0"/>
+              </a:rPr>
+              <a:t>Encoding Actual URL</a:t>
+            </a:r>
+          </a:p>
+          <a:p>
+            <a:endParaRPr lang="en-IN" sz="1000" dirty="0">
+              <a:latin typeface="Century Gothic" panose="020B0502020202020204" pitchFamily="34" charset="0"/>
+            </a:endParaRPr>
+          </a:p>
+          <a:p>
+            <a:r>
+              <a:rPr lang="en-IN" sz="1000" b="1" dirty="0">
+                <a:latin typeface="Century Gothic" panose="020B0502020202020204" pitchFamily="34" charset="0"/>
+              </a:rPr>
+              <a:t>So Pict-01 </a:t>
+            </a:r>
+            <a:r>
+              <a:rPr lang="en-IN" sz="1000" dirty="0">
+                <a:latin typeface="Century Gothic" panose="020B0502020202020204" pitchFamily="34" charset="0"/>
+              </a:rPr>
+              <a:t>is our initial basic design (</a:t>
+            </a:r>
+            <a:r>
+              <a:rPr lang="en-IN" sz="1000" b="1" dirty="0">
+                <a:latin typeface="Century Gothic" panose="020B0502020202020204" pitchFamily="34" charset="0"/>
+              </a:rPr>
+              <a:t>Approach 01</a:t>
+            </a:r>
+            <a:r>
+              <a:rPr lang="en-IN" sz="1000" dirty="0">
+                <a:latin typeface="Century Gothic" panose="020B0502020202020204" pitchFamily="34" charset="0"/>
+              </a:rPr>
+              <a:t>) where we have shown the basic flow, about how system is sequentially interacting for simple use-case like “User or client requested for the short url and in return server is returning the short url after the successful completion all intermediate steps”</a:t>
+            </a:r>
+          </a:p>
+          <a:p>
+            <a:endParaRPr lang="en-IN" sz="1000" dirty="0">
+              <a:latin typeface="Century Gothic" panose="020B0502020202020204" pitchFamily="34" charset="0"/>
+            </a:endParaRPr>
+          </a:p>
+          <a:p>
+            <a:r>
+              <a:rPr lang="en-IN" sz="1000" dirty="0">
+                <a:latin typeface="Century Gothic" panose="020B0502020202020204" pitchFamily="34" charset="0"/>
+              </a:rPr>
+              <a:t>Here in interaction diagram ( PICT-01) showing the System have majorly 03 components</a:t>
+            </a:r>
+          </a:p>
+          <a:p>
+            <a:pPr marL="228600" indent="-228600">
+              <a:buAutoNum type="arabicPeriod"/>
+            </a:pPr>
+            <a:r>
+              <a:rPr lang="en-IN" sz="1000" dirty="0">
+                <a:latin typeface="Century Gothic" panose="020B0502020202020204" pitchFamily="34" charset="0"/>
+              </a:rPr>
+              <a:t>Server ( API Server )</a:t>
+            </a:r>
+          </a:p>
+          <a:p>
+            <a:pPr marL="228600" indent="-228600">
+              <a:buAutoNum type="arabicPeriod"/>
+            </a:pPr>
+            <a:r>
+              <a:rPr lang="en-IN" sz="1000" dirty="0">
+                <a:latin typeface="Century Gothic" panose="020B0502020202020204" pitchFamily="34" charset="0"/>
+              </a:rPr>
+              <a:t>Encoding Component Server</a:t>
+            </a:r>
+          </a:p>
+          <a:p>
+            <a:pPr marL="228600" indent="-228600">
+              <a:buAutoNum type="arabicPeriod"/>
+            </a:pPr>
+            <a:r>
+              <a:rPr lang="en-IN" sz="1000" dirty="0">
+                <a:latin typeface="Century Gothic" panose="020B0502020202020204" pitchFamily="34" charset="0"/>
+              </a:rPr>
+              <a:t>Database ( DB Server for Storage and persistency )</a:t>
+            </a:r>
+          </a:p>
+          <a:p>
+            <a:endParaRPr lang="en-IN" sz="1100" dirty="0">
+              <a:latin typeface="Century Gothic" panose="020B0502020202020204" pitchFamily="34" charset="0"/>
+            </a:endParaRPr>
+          </a:p>
+          <a:p>
+            <a:r>
+              <a:rPr lang="en-IN" sz="1000" dirty="0">
+                <a:latin typeface="Century Gothic" panose="020B0502020202020204" pitchFamily="34" charset="0"/>
+              </a:rPr>
+              <a:t>Steps to produce shortURL or unique key</a:t>
+            </a:r>
+          </a:p>
+          <a:p>
+            <a:pPr marL="228600" indent="-228600">
+              <a:buAutoNum type="arabicPeriod"/>
+            </a:pPr>
+            <a:r>
+              <a:rPr lang="en-IN" sz="1000" dirty="0">
+                <a:latin typeface="Century Gothic" panose="020B0502020202020204" pitchFamily="34" charset="0"/>
+              </a:rPr>
+              <a:t>Compute an unique hash using standard Hash function like MD5 or SHA256 </a:t>
+            </a:r>
+          </a:p>
+          <a:p>
+            <a:pPr marL="228600" indent="-228600">
+              <a:buAutoNum type="arabicPeriod"/>
+            </a:pPr>
+            <a:r>
+              <a:rPr lang="en-IN" sz="1000" dirty="0">
+                <a:latin typeface="Century Gothic" panose="020B0502020202020204" pitchFamily="34" charset="0"/>
+              </a:rPr>
+              <a:t>Now next thing is to encode this hash value for display, and for this encoding could be </a:t>
+            </a:r>
+            <a:r>
+              <a:rPr lang="en-IN" sz="1000" b="1" dirty="0">
+                <a:solidFill>
+                  <a:srgbClr val="00B0F0"/>
+                </a:solidFill>
+                <a:latin typeface="Century Gothic" panose="020B0502020202020204" pitchFamily="34" charset="0"/>
+              </a:rPr>
+              <a:t>Base64</a:t>
+            </a:r>
+            <a:r>
+              <a:rPr lang="en-IN" sz="1000" dirty="0">
+                <a:latin typeface="Century Gothic" panose="020B0502020202020204" pitchFamily="34" charset="0"/>
+              </a:rPr>
+              <a:t> [A~Z, a ~ z, 0 ~ 9, ‘+’,’/’] </a:t>
+            </a:r>
+          </a:p>
+          <a:p>
+            <a:pPr marL="228600" indent="-228600">
+              <a:buAutoNum type="arabicPeriod"/>
+            </a:pPr>
+            <a:r>
+              <a:rPr lang="en-IN" sz="1000" dirty="0">
+                <a:latin typeface="Century Gothic" panose="020B0502020202020204" pitchFamily="34" charset="0"/>
+              </a:rPr>
+              <a:t>Next thing is to understand that how big of this shortURL length would be suffice ? </a:t>
+            </a:r>
+          </a:p>
+          <a:p>
+            <a:r>
+              <a:rPr lang="en-IN" sz="1000" dirty="0">
+                <a:latin typeface="Century Gothic" panose="020B0502020202020204" pitchFamily="34" charset="0"/>
+              </a:rPr>
+              <a:t>To understand this let’s calculate the unique value of key’s possible with different length</a:t>
+            </a:r>
+          </a:p>
+          <a:p>
+            <a:r>
+              <a:rPr lang="en-IN" sz="1000" dirty="0">
+                <a:latin typeface="Century Gothic" panose="020B0502020202020204" pitchFamily="34" charset="0"/>
+              </a:rPr>
+              <a:t>So, according to the requirement you can choose the length of your shortURL. Please note </a:t>
+            </a:r>
+          </a:p>
+          <a:p>
+            <a:r>
+              <a:rPr lang="en-IN" sz="1000" dirty="0">
+                <a:latin typeface="Century Gothic" panose="020B0502020202020204" pitchFamily="34" charset="0"/>
+              </a:rPr>
+              <a:t>that small url is easy to remember but also less number of unique key and that would get exhausted very fast as your system user grows.</a:t>
+            </a:r>
+          </a:p>
+          <a:p>
+            <a:endParaRPr lang="en-IN" sz="1000" dirty="0">
+              <a:latin typeface="Century Gothic" panose="020B0502020202020204" pitchFamily="34" charset="0"/>
+            </a:endParaRPr>
+          </a:p>
+          <a:p>
+            <a:endParaRPr lang="en-IN" sz="1000" dirty="0">
+              <a:latin typeface="Century Gothic" panose="020B0502020202020204" pitchFamily="34" charset="0"/>
+            </a:endParaRPr>
+          </a:p>
+        </p:txBody>
+      </p:sp>
+      <p:pic>
+        <p:nvPicPr>
+          <p:cNvPr id="23" name="Picture 22">
+            <a:extLst>
+              <a:ext uri="{FF2B5EF4-FFF2-40B4-BE49-F238E27FC236}">
+                <a16:creationId xmlns:a16="http://schemas.microsoft.com/office/drawing/2014/main" id="{956D2247-9B8B-4323-B96C-73A5987CE3C9}"/>
+              </a:ext>
+            </a:extLst>
+          </p:cNvPr>
+          <p:cNvPicPr>
+            <a:picLocks noChangeAspect="1"/>
+          </p:cNvPicPr>
+          <p:nvPr/>
+        </p:nvPicPr>
+        <p:blipFill>
+          <a:blip r:embed="rId3"/>
+          <a:stretch>
+            <a:fillRect/>
+          </a:stretch>
+        </p:blipFill>
+        <p:spPr>
+          <a:xfrm>
+            <a:off x="6458741" y="871671"/>
+            <a:ext cx="5239481" cy="2495898"/>
+          </a:xfrm>
+          <a:prstGeom prst="rect">
+            <a:avLst/>
+          </a:prstGeom>
+        </p:spPr>
+      </p:pic>
+      <p:sp>
+        <p:nvSpPr>
+          <p:cNvPr id="24" name="Rectangle 23">
+            <a:extLst>
+              <a:ext uri="{FF2B5EF4-FFF2-40B4-BE49-F238E27FC236}">
+                <a16:creationId xmlns:a16="http://schemas.microsoft.com/office/drawing/2014/main" id="{92A5597F-D427-4CC9-B338-150B55528393}"/>
+              </a:ext>
+            </a:extLst>
+          </p:cNvPr>
+          <p:cNvSpPr/>
+          <p:nvPr/>
+        </p:nvSpPr>
+        <p:spPr>
+          <a:xfrm>
+            <a:off x="6446982" y="871671"/>
+            <a:ext cx="5264727" cy="2481129"/>
+          </a:xfrm>
+          <a:prstGeom prst="rect">
+            <a:avLst/>
+          </a:prstGeom>
+          <a:noFill/>
+          <a:ln w="9525" cap="flat" cmpd="sng" algn="ctr">
+            <a:solidFill>
+              <a:schemeClr val="accent3"/>
+            </a:solidFill>
+            <a:prstDash val="solid"/>
+            <a:round/>
+            <a:headEnd type="none" w="med" len="med"/>
+            <a:tailEnd type="none" w="med" len="med"/>
+          </a:ln>
+        </p:spPr>
+        <p:style>
+          <a:lnRef idx="0">
+            <a:scrgbClr r="0" g="0" b="0"/>
+          </a:lnRef>
+          <a:fillRef idx="0">
+            <a:scrgbClr r="0" g="0" b="0"/>
+          </a:fillRef>
+          <a:effectRef idx="0">
+            <a:scrgbClr r="0" g="0" b="0"/>
+          </a:effectRef>
+          <a:fontRef idx="minor">
+            <a:schemeClr val="accent3"/>
+          </a:fontRef>
+        </p:style>
+        <p:txBody>
+          <a:bodyPr rtlCol="0" anchor="ctr"/>
+          <a:lstStyle/>
+          <a:p>
+            <a:pPr algn="ctr"/>
             <a:endParaRPr lang="en-IN" dirty="0"/>
           </a:p>
-          <a:p>
+        </p:txBody>
+      </p:sp>
+      <p:sp>
+        <p:nvSpPr>
+          <p:cNvPr id="25" name="Oval 24">
+            <a:extLst>
+              <a:ext uri="{FF2B5EF4-FFF2-40B4-BE49-F238E27FC236}">
+                <a16:creationId xmlns:a16="http://schemas.microsoft.com/office/drawing/2014/main" id="{2C1896E0-9F15-4ABC-B139-E13C730485FE}"/>
+              </a:ext>
+            </a:extLst>
+          </p:cNvPr>
+          <p:cNvSpPr/>
+          <p:nvPr/>
+        </p:nvSpPr>
+        <p:spPr>
+          <a:xfrm>
+            <a:off x="7469629" y="948583"/>
+            <a:ext cx="256374" cy="256374"/>
+          </a:xfrm>
+          <a:prstGeom prst="ellipse">
+            <a:avLst/>
+          </a:prstGeom>
+        </p:spPr>
+        <p:style>
+          <a:lnRef idx="0">
+            <a:schemeClr val="accent5"/>
+          </a:lnRef>
+          <a:fillRef idx="3">
+            <a:schemeClr val="accent5"/>
+          </a:fillRef>
+          <a:effectRef idx="3">
+            <a:schemeClr val="accent5"/>
+          </a:effectRef>
+          <a:fontRef idx="minor">
+            <a:schemeClr val="lt1"/>
+          </a:fontRef>
+        </p:style>
+        <p:txBody>
+          <a:bodyPr rtlCol="0" anchor="ctr"/>
+          <a:lstStyle/>
+          <a:p>
+            <a:pPr algn="ctr"/>
+            <a:r>
+              <a:rPr lang="en-IN" sz="1600" dirty="0"/>
+              <a:t>1</a:t>
+            </a:r>
+          </a:p>
+        </p:txBody>
+      </p:sp>
+      <p:sp>
+        <p:nvSpPr>
+          <p:cNvPr id="26" name="Oval 25">
+            <a:extLst>
+              <a:ext uri="{FF2B5EF4-FFF2-40B4-BE49-F238E27FC236}">
+                <a16:creationId xmlns:a16="http://schemas.microsoft.com/office/drawing/2014/main" id="{9529E07A-D8C2-4079-AF74-5BD3544D42AA}"/>
+              </a:ext>
+            </a:extLst>
+          </p:cNvPr>
+          <p:cNvSpPr/>
+          <p:nvPr/>
+        </p:nvSpPr>
+        <p:spPr>
+          <a:xfrm>
+            <a:off x="9455738" y="948583"/>
+            <a:ext cx="256374" cy="256374"/>
+          </a:xfrm>
+          <a:prstGeom prst="ellipse">
+            <a:avLst/>
+          </a:prstGeom>
+        </p:spPr>
+        <p:style>
+          <a:lnRef idx="0">
+            <a:schemeClr val="accent5"/>
+          </a:lnRef>
+          <a:fillRef idx="3">
+            <a:schemeClr val="accent5"/>
+          </a:fillRef>
+          <a:effectRef idx="3">
+            <a:schemeClr val="accent5"/>
+          </a:effectRef>
+          <a:fontRef idx="minor">
+            <a:schemeClr val="lt1"/>
+          </a:fontRef>
+        </p:style>
+        <p:txBody>
+          <a:bodyPr rtlCol="0" anchor="ctr"/>
+          <a:lstStyle/>
+          <a:p>
+            <a:pPr algn="ctr"/>
+            <a:r>
+              <a:rPr lang="en-IN" sz="1600" dirty="0"/>
+              <a:t>2</a:t>
+            </a:r>
+          </a:p>
+        </p:txBody>
+      </p:sp>
+      <p:sp>
+        <p:nvSpPr>
+          <p:cNvPr id="27" name="Oval 26">
+            <a:extLst>
+              <a:ext uri="{FF2B5EF4-FFF2-40B4-BE49-F238E27FC236}">
+                <a16:creationId xmlns:a16="http://schemas.microsoft.com/office/drawing/2014/main" id="{655BE4BA-0271-49FE-9EDD-9382BAE787B7}"/>
+              </a:ext>
+            </a:extLst>
+          </p:cNvPr>
+          <p:cNvSpPr/>
+          <p:nvPr/>
+        </p:nvSpPr>
+        <p:spPr>
+          <a:xfrm>
+            <a:off x="9455738" y="1743758"/>
+            <a:ext cx="256374" cy="256374"/>
+          </a:xfrm>
+          <a:prstGeom prst="ellipse">
+            <a:avLst/>
+          </a:prstGeom>
+        </p:spPr>
+        <p:style>
+          <a:lnRef idx="0">
+            <a:schemeClr val="accent5"/>
+          </a:lnRef>
+          <a:fillRef idx="3">
+            <a:schemeClr val="accent5"/>
+          </a:fillRef>
+          <a:effectRef idx="3">
+            <a:schemeClr val="accent5"/>
+          </a:effectRef>
+          <a:fontRef idx="minor">
+            <a:schemeClr val="lt1"/>
+          </a:fontRef>
+        </p:style>
+        <p:txBody>
+          <a:bodyPr rtlCol="0" anchor="ctr"/>
+          <a:lstStyle/>
+          <a:p>
+            <a:pPr algn="ctr"/>
+            <a:r>
+              <a:rPr lang="en-IN" sz="1600" dirty="0"/>
+              <a:t>3</a:t>
+            </a:r>
+          </a:p>
+        </p:txBody>
+      </p:sp>
+      <p:sp>
+        <p:nvSpPr>
+          <p:cNvPr id="28" name="Oval 27">
+            <a:extLst>
+              <a:ext uri="{FF2B5EF4-FFF2-40B4-BE49-F238E27FC236}">
+                <a16:creationId xmlns:a16="http://schemas.microsoft.com/office/drawing/2014/main" id="{BEFB0D60-D449-4230-9E68-8F36D3083731}"/>
+              </a:ext>
+            </a:extLst>
+          </p:cNvPr>
+          <p:cNvSpPr/>
+          <p:nvPr/>
+        </p:nvSpPr>
+        <p:spPr>
+          <a:xfrm>
+            <a:off x="10565267" y="2112235"/>
+            <a:ext cx="256374" cy="256374"/>
+          </a:xfrm>
+          <a:prstGeom prst="ellipse">
+            <a:avLst/>
+          </a:prstGeom>
+        </p:spPr>
+        <p:style>
+          <a:lnRef idx="0">
+            <a:schemeClr val="accent5"/>
+          </a:lnRef>
+          <a:fillRef idx="3">
+            <a:schemeClr val="accent5"/>
+          </a:fillRef>
+          <a:effectRef idx="3">
+            <a:schemeClr val="accent5"/>
+          </a:effectRef>
+          <a:fontRef idx="minor">
+            <a:schemeClr val="lt1"/>
+          </a:fontRef>
+        </p:style>
+        <p:txBody>
+          <a:bodyPr rtlCol="0" anchor="ctr"/>
+          <a:lstStyle/>
+          <a:p>
+            <a:pPr algn="ctr"/>
+            <a:r>
+              <a:rPr lang="en-IN" sz="1600" dirty="0"/>
+              <a:t>4</a:t>
+            </a:r>
+          </a:p>
+        </p:txBody>
+      </p:sp>
+      <p:sp>
+        <p:nvSpPr>
+          <p:cNvPr id="29" name="Oval 28">
+            <a:extLst>
+              <a:ext uri="{FF2B5EF4-FFF2-40B4-BE49-F238E27FC236}">
+                <a16:creationId xmlns:a16="http://schemas.microsoft.com/office/drawing/2014/main" id="{9A42AA1C-E6DB-4AC4-94DE-16D316F0880B}"/>
+              </a:ext>
+            </a:extLst>
+          </p:cNvPr>
+          <p:cNvSpPr/>
+          <p:nvPr/>
+        </p:nvSpPr>
+        <p:spPr>
+          <a:xfrm>
+            <a:off x="8383817" y="1984048"/>
+            <a:ext cx="256374" cy="256374"/>
+          </a:xfrm>
+          <a:prstGeom prst="ellipse">
+            <a:avLst/>
+          </a:prstGeom>
+        </p:spPr>
+        <p:style>
+          <a:lnRef idx="0">
+            <a:schemeClr val="accent5"/>
+          </a:lnRef>
+          <a:fillRef idx="3">
+            <a:schemeClr val="accent5"/>
+          </a:fillRef>
+          <a:effectRef idx="3">
+            <a:schemeClr val="accent5"/>
+          </a:effectRef>
+          <a:fontRef idx="minor">
+            <a:schemeClr val="lt1"/>
+          </a:fontRef>
+        </p:style>
+        <p:txBody>
+          <a:bodyPr rtlCol="0" anchor="ctr"/>
+          <a:lstStyle/>
+          <a:p>
+            <a:pPr algn="ctr"/>
+            <a:r>
+              <a:rPr lang="en-IN" sz="1600" dirty="0"/>
+              <a:t>5</a:t>
+            </a:r>
+          </a:p>
+        </p:txBody>
+      </p:sp>
+      <p:sp>
+        <p:nvSpPr>
+          <p:cNvPr id="30" name="Oval 29">
+            <a:extLst>
+              <a:ext uri="{FF2B5EF4-FFF2-40B4-BE49-F238E27FC236}">
+                <a16:creationId xmlns:a16="http://schemas.microsoft.com/office/drawing/2014/main" id="{54D18CA5-282E-45C0-B06B-509C4188630C}"/>
+              </a:ext>
+            </a:extLst>
+          </p:cNvPr>
+          <p:cNvSpPr/>
+          <p:nvPr/>
+        </p:nvSpPr>
+        <p:spPr>
+          <a:xfrm>
+            <a:off x="7469629" y="1693754"/>
+            <a:ext cx="256374" cy="256374"/>
+          </a:xfrm>
+          <a:prstGeom prst="ellipse">
+            <a:avLst/>
+          </a:prstGeom>
+        </p:spPr>
+        <p:style>
+          <a:lnRef idx="0">
+            <a:schemeClr val="accent5"/>
+          </a:lnRef>
+          <a:fillRef idx="3">
+            <a:schemeClr val="accent5"/>
+          </a:fillRef>
+          <a:effectRef idx="3">
+            <a:schemeClr val="accent5"/>
+          </a:effectRef>
+          <a:fontRef idx="minor">
+            <a:schemeClr val="lt1"/>
+          </a:fontRef>
+        </p:style>
+        <p:txBody>
+          <a:bodyPr rtlCol="0" anchor="ctr"/>
+          <a:lstStyle/>
+          <a:p>
+            <a:pPr algn="ctr"/>
+            <a:r>
+              <a:rPr lang="en-IN" sz="1600" dirty="0"/>
+              <a:t>6</a:t>
+            </a:r>
+          </a:p>
+        </p:txBody>
+      </p:sp>
+      <p:sp>
+        <p:nvSpPr>
+          <p:cNvPr id="31" name="TextBox 30">
+            <a:extLst>
+              <a:ext uri="{FF2B5EF4-FFF2-40B4-BE49-F238E27FC236}">
+                <a16:creationId xmlns:a16="http://schemas.microsoft.com/office/drawing/2014/main" id="{33A7460D-522D-4D30-8F40-F84AACCC2D3C}"/>
+              </a:ext>
+            </a:extLst>
+          </p:cNvPr>
+          <p:cNvSpPr txBox="1"/>
+          <p:nvPr/>
+        </p:nvSpPr>
+        <p:spPr>
+          <a:xfrm>
+            <a:off x="6674266" y="2590800"/>
+            <a:ext cx="666571" cy="246221"/>
+          </a:xfrm>
+          <a:prstGeom prst="rect">
+            <a:avLst/>
+          </a:prstGeom>
+          <a:noFill/>
+        </p:spPr>
+        <p:txBody>
+          <a:bodyPr wrap="square" rtlCol="0">
+            <a:spAutoFit/>
+          </a:bodyPr>
+          <a:lstStyle/>
+          <a:p>
+            <a:r>
+              <a:rPr lang="en-IN" sz="1000" b="1" dirty="0">
+                <a:latin typeface="Century Gothic" panose="020B0502020202020204" pitchFamily="34" charset="0"/>
+              </a:rPr>
+              <a:t>PICT-01</a:t>
+            </a:r>
+          </a:p>
+        </p:txBody>
+      </p:sp>
+      <p:sp>
+        <p:nvSpPr>
+          <p:cNvPr id="35" name="Rectangle: Rounded Corners 34">
+            <a:extLst>
+              <a:ext uri="{FF2B5EF4-FFF2-40B4-BE49-F238E27FC236}">
+                <a16:creationId xmlns:a16="http://schemas.microsoft.com/office/drawing/2014/main" id="{6CFD54EF-3563-4E1E-BA61-444F0E38FCAF}"/>
+              </a:ext>
+            </a:extLst>
+          </p:cNvPr>
+          <p:cNvSpPr/>
+          <p:nvPr/>
+        </p:nvSpPr>
+        <p:spPr>
+          <a:xfrm>
+            <a:off x="8156384" y="948583"/>
+            <a:ext cx="3377310" cy="2282990"/>
+          </a:xfrm>
+          <a:prstGeom prst="roundRect">
+            <a:avLst/>
+          </a:prstGeom>
+          <a:noFill/>
+          <a:ln w="9525" cap="flat" cmpd="sng" algn="ctr">
+            <a:solidFill>
+              <a:schemeClr val="accent5"/>
+            </a:solidFill>
+            <a:prstDash val="solid"/>
+            <a:round/>
+            <a:headEnd type="none" w="med" len="med"/>
+            <a:tailEnd type="none" w="med" len="med"/>
+          </a:ln>
+        </p:spPr>
+        <p:style>
+          <a:lnRef idx="0">
+            <a:scrgbClr r="0" g="0" b="0"/>
+          </a:lnRef>
+          <a:fillRef idx="0">
+            <a:scrgbClr r="0" g="0" b="0"/>
+          </a:fillRef>
+          <a:effectRef idx="0">
+            <a:scrgbClr r="0" g="0" b="0"/>
+          </a:effectRef>
+          <a:fontRef idx="minor">
+            <a:schemeClr val="accent5"/>
+          </a:fontRef>
+        </p:style>
+        <p:txBody>
+          <a:bodyPr rtlCol="0" anchor="ctr"/>
+          <a:lstStyle/>
+          <a:p>
+            <a:pPr algn="ctr"/>
             <a:endParaRPr lang="en-IN" dirty="0"/>
           </a:p>
-          <a:p>
+        </p:txBody>
+      </p:sp>
+      <p:sp>
+        <p:nvSpPr>
+          <p:cNvPr id="36" name="Arrow: Notched Right 35">
+            <a:extLst>
+              <a:ext uri="{FF2B5EF4-FFF2-40B4-BE49-F238E27FC236}">
+                <a16:creationId xmlns:a16="http://schemas.microsoft.com/office/drawing/2014/main" id="{EE7AB3FA-2A25-4804-8171-57181C55A79A}"/>
+              </a:ext>
+            </a:extLst>
+          </p:cNvPr>
+          <p:cNvSpPr/>
+          <p:nvPr/>
+        </p:nvSpPr>
+        <p:spPr>
+          <a:xfrm>
+            <a:off x="5330536" y="2493818"/>
+            <a:ext cx="1330243" cy="488373"/>
+          </a:xfrm>
+          <a:prstGeom prst="notchedRightArrow">
+            <a:avLst/>
+          </a:prstGeom>
+        </p:spPr>
+        <p:style>
+          <a:lnRef idx="0">
+            <a:schemeClr val="accent1"/>
+          </a:lnRef>
+          <a:fillRef idx="3">
+            <a:schemeClr val="accent1"/>
+          </a:fillRef>
+          <a:effectRef idx="3">
+            <a:schemeClr val="accent1"/>
+          </a:effectRef>
+          <a:fontRef idx="minor">
+            <a:schemeClr val="lt1"/>
+          </a:fontRef>
+        </p:style>
+        <p:txBody>
+          <a:bodyPr rtlCol="0" anchor="ctr"/>
+          <a:lstStyle/>
+          <a:p>
+            <a:pPr algn="ctr"/>
             <a:endParaRPr lang="en-IN" dirty="0"/>
+          </a:p>
+        </p:txBody>
+      </p:sp>
+      <p:sp>
+        <p:nvSpPr>
+          <p:cNvPr id="37" name="Rectangle 36">
+            <a:extLst>
+              <a:ext uri="{FF2B5EF4-FFF2-40B4-BE49-F238E27FC236}">
+                <a16:creationId xmlns:a16="http://schemas.microsoft.com/office/drawing/2014/main" id="{603B763F-A129-4F43-9C8F-46ADC920488D}"/>
+              </a:ext>
+            </a:extLst>
+          </p:cNvPr>
+          <p:cNvSpPr/>
+          <p:nvPr/>
+        </p:nvSpPr>
+        <p:spPr>
+          <a:xfrm>
+            <a:off x="10359736" y="1028699"/>
+            <a:ext cx="945573" cy="758795"/>
+          </a:xfrm>
+          <a:prstGeom prst="rect">
+            <a:avLst/>
+          </a:prstGeom>
+          <a:noFill/>
+          <a:ln w="9525" cap="flat" cmpd="sng" algn="ctr">
+            <a:solidFill>
+              <a:schemeClr val="accent2"/>
+            </a:solidFill>
+            <a:prstDash val="solid"/>
+            <a:round/>
+            <a:headEnd type="none" w="med" len="med"/>
+            <a:tailEnd type="none" w="med" len="med"/>
+          </a:ln>
+        </p:spPr>
+        <p:style>
+          <a:lnRef idx="0">
+            <a:scrgbClr r="0" g="0" b="0"/>
+          </a:lnRef>
+          <a:fillRef idx="0">
+            <a:scrgbClr r="0" g="0" b="0"/>
+          </a:fillRef>
+          <a:effectRef idx="0">
+            <a:scrgbClr r="0" g="0" b="0"/>
+          </a:effectRef>
+          <a:fontRef idx="minor">
+            <a:schemeClr val="accent2"/>
+          </a:fontRef>
+        </p:style>
+        <p:txBody>
+          <a:bodyPr rtlCol="0" anchor="ctr"/>
+          <a:lstStyle/>
+          <a:p>
+            <a:pPr algn="ctr"/>
+            <a:endParaRPr lang="en-IN" dirty="0"/>
+          </a:p>
+        </p:txBody>
+      </p:sp>
+      <p:graphicFrame>
+        <p:nvGraphicFramePr>
+          <p:cNvPr id="38" name="Table 38">
+            <a:extLst>
+              <a:ext uri="{FF2B5EF4-FFF2-40B4-BE49-F238E27FC236}">
+                <a16:creationId xmlns:a16="http://schemas.microsoft.com/office/drawing/2014/main" id="{459D43AC-705A-4877-A2B3-87CA886241ED}"/>
+              </a:ext>
+            </a:extLst>
+          </p:cNvPr>
+          <p:cNvGraphicFramePr>
+            <a:graphicFrameLocks noGrp="1"/>
+          </p:cNvGraphicFramePr>
+          <p:nvPr>
+            <p:extLst>
+              <p:ext uri="{D42A27DB-BD31-4B8C-83A1-F6EECF244321}">
+                <p14:modId xmlns:p14="http://schemas.microsoft.com/office/powerpoint/2010/main" val="1323569895"/>
+              </p:ext>
+            </p:extLst>
+          </p:nvPr>
+        </p:nvGraphicFramePr>
+        <p:xfrm>
+          <a:off x="3240027" y="5882677"/>
+          <a:ext cx="2948300" cy="904053"/>
+        </p:xfrm>
+        <a:graphic>
+          <a:graphicData uri="http://schemas.openxmlformats.org/drawingml/2006/table">
+            <a:tbl>
+              <a:tblPr firstRow="1" bandRow="1">
+                <a:tableStyleId>{5C22544A-7EE6-4342-B048-85BDC9FD1C3A}</a:tableStyleId>
+              </a:tblPr>
+              <a:tblGrid>
+                <a:gridCol w="1474150">
+                  <a:extLst>
+                    <a:ext uri="{9D8B030D-6E8A-4147-A177-3AD203B41FA5}">
+                      <a16:colId xmlns:a16="http://schemas.microsoft.com/office/drawing/2014/main" val="220746945"/>
+                    </a:ext>
+                  </a:extLst>
+                </a:gridCol>
+                <a:gridCol w="1474150">
+                  <a:extLst>
+                    <a:ext uri="{9D8B030D-6E8A-4147-A177-3AD203B41FA5}">
+                      <a16:colId xmlns:a16="http://schemas.microsoft.com/office/drawing/2014/main" val="1927556346"/>
+                    </a:ext>
+                  </a:extLst>
+                </a:gridCol>
+              </a:tblGrid>
+              <a:tr h="301351">
+                <a:tc>
+                  <a:txBody>
+                    <a:bodyPr/>
+                    <a:lstStyle/>
+                    <a:p>
+                      <a:pPr algn="ctr"/>
+                      <a:r>
+                        <a:rPr lang="en-IN" sz="1000" dirty="0">
+                          <a:latin typeface="Century Gothic" panose="020B0502020202020204" pitchFamily="34" charset="0"/>
+                        </a:rPr>
+                        <a:t>Len = 6</a:t>
+                      </a:r>
+                    </a:p>
+                  </a:txBody>
+                  <a:tcPr>
+                    <a:solidFill>
+                      <a:srgbClr val="0070C0"/>
+                    </a:solidFill>
+                  </a:tcPr>
+                </a:tc>
+                <a:tc>
+                  <a:txBody>
+                    <a:bodyPr/>
+                    <a:lstStyle/>
+                    <a:p>
+                      <a:pPr algn="ctr"/>
+                      <a:r>
+                        <a:rPr lang="en-IN" sz="1000" dirty="0">
+                          <a:latin typeface="Century Gothic" panose="020B0502020202020204" pitchFamily="34" charset="0"/>
+                        </a:rPr>
+                        <a:t>64^6 = 69 billion </a:t>
+                      </a:r>
+                    </a:p>
+                  </a:txBody>
+                  <a:tcPr>
+                    <a:solidFill>
+                      <a:srgbClr val="0070C0"/>
+                    </a:solidFill>
+                  </a:tcPr>
+                </a:tc>
+                <a:extLst>
+                  <a:ext uri="{0D108BD9-81ED-4DB2-BD59-A6C34878D82A}">
+                    <a16:rowId xmlns:a16="http://schemas.microsoft.com/office/drawing/2014/main" val="36620862"/>
+                  </a:ext>
+                </a:extLst>
+              </a:tr>
+              <a:tr h="301351">
+                <a:tc>
+                  <a:txBody>
+                    <a:bodyPr/>
+                    <a:lstStyle/>
+                    <a:p>
+                      <a:pPr marL="0" algn="ctr" defTabSz="914400" rtl="0" eaLnBrk="1" latinLnBrk="0" hangingPunct="1"/>
+                      <a:r>
+                        <a:rPr lang="en-IN" sz="1000" b="1" kern="1200" dirty="0">
+                          <a:solidFill>
+                            <a:schemeClr val="lt1"/>
+                          </a:solidFill>
+                          <a:latin typeface="Century Gothic" panose="020B0502020202020204" pitchFamily="34" charset="0"/>
+                          <a:ea typeface="+mn-ea"/>
+                          <a:cs typeface="+mn-cs"/>
+                        </a:rPr>
+                        <a:t>Len = 7</a:t>
+                      </a:r>
+                    </a:p>
+                  </a:txBody>
+                  <a:tcPr>
+                    <a:solidFill>
+                      <a:srgbClr val="0070C0"/>
+                    </a:solidFill>
+                  </a:tcPr>
+                </a:tc>
+                <a:tc>
+                  <a:txBody>
+                    <a:bodyPr/>
+                    <a:lstStyle/>
+                    <a:p>
+                      <a:pPr marL="0" algn="ctr" defTabSz="914400" rtl="0" eaLnBrk="1" latinLnBrk="0" hangingPunct="1"/>
+                      <a:r>
+                        <a:rPr lang="en-IN" sz="1000" b="1" kern="1200" dirty="0">
+                          <a:solidFill>
+                            <a:schemeClr val="lt1"/>
+                          </a:solidFill>
+                          <a:latin typeface="Century Gothic" panose="020B0502020202020204" pitchFamily="34" charset="0"/>
+                          <a:ea typeface="+mn-ea"/>
+                          <a:cs typeface="+mn-cs"/>
+                        </a:rPr>
+                        <a:t>64^7 = 4 trillion</a:t>
+                      </a:r>
+                    </a:p>
+                  </a:txBody>
+                  <a:tcPr>
+                    <a:solidFill>
+                      <a:srgbClr val="0070C0"/>
+                    </a:solidFill>
+                  </a:tcPr>
+                </a:tc>
+                <a:extLst>
+                  <a:ext uri="{0D108BD9-81ED-4DB2-BD59-A6C34878D82A}">
+                    <a16:rowId xmlns:a16="http://schemas.microsoft.com/office/drawing/2014/main" val="3724343040"/>
+                  </a:ext>
+                </a:extLst>
+              </a:tr>
+              <a:tr h="301351">
+                <a:tc>
+                  <a:txBody>
+                    <a:bodyPr/>
+                    <a:lstStyle/>
+                    <a:p>
+                      <a:pPr marL="0" algn="ctr" defTabSz="914400" rtl="0" eaLnBrk="1" latinLnBrk="0" hangingPunct="1"/>
+                      <a:r>
+                        <a:rPr lang="en-IN" sz="1000" b="1" kern="1200" dirty="0">
+                          <a:solidFill>
+                            <a:schemeClr val="lt1"/>
+                          </a:solidFill>
+                          <a:latin typeface="Century Gothic" panose="020B0502020202020204" pitchFamily="34" charset="0"/>
+                          <a:ea typeface="+mn-ea"/>
+                          <a:cs typeface="+mn-cs"/>
+                        </a:rPr>
+                        <a:t>Len = 8</a:t>
+                      </a:r>
+                    </a:p>
+                  </a:txBody>
+                  <a:tcPr>
+                    <a:solidFill>
+                      <a:srgbClr val="0070C0"/>
+                    </a:solidFill>
+                  </a:tcPr>
+                </a:tc>
+                <a:tc>
+                  <a:txBody>
+                    <a:bodyPr/>
+                    <a:lstStyle/>
+                    <a:p>
+                      <a:pPr marL="0" algn="ctr" defTabSz="914400" rtl="0" eaLnBrk="1" latinLnBrk="0" hangingPunct="1"/>
+                      <a:r>
+                        <a:rPr lang="en-IN" sz="1000" b="1" kern="1200" dirty="0">
+                          <a:solidFill>
+                            <a:schemeClr val="lt1"/>
+                          </a:solidFill>
+                          <a:latin typeface="Century Gothic" panose="020B0502020202020204" pitchFamily="34" charset="0"/>
+                          <a:ea typeface="+mn-ea"/>
+                          <a:cs typeface="+mn-cs"/>
+                        </a:rPr>
+                        <a:t>64^8 = 281 trillion</a:t>
+                      </a:r>
+                    </a:p>
+                  </a:txBody>
+                  <a:tcPr>
+                    <a:solidFill>
+                      <a:srgbClr val="0070C0"/>
+                    </a:solidFill>
+                  </a:tcPr>
+                </a:tc>
+                <a:extLst>
+                  <a:ext uri="{0D108BD9-81ED-4DB2-BD59-A6C34878D82A}">
+                    <a16:rowId xmlns:a16="http://schemas.microsoft.com/office/drawing/2014/main" val="3943200302"/>
+                  </a:ext>
+                </a:extLst>
+              </a:tr>
+            </a:tbl>
+          </a:graphicData>
+        </a:graphic>
+      </p:graphicFrame>
+      <p:sp>
+        <p:nvSpPr>
+          <p:cNvPr id="40" name="TextBox 39">
+            <a:extLst>
+              <a:ext uri="{FF2B5EF4-FFF2-40B4-BE49-F238E27FC236}">
+                <a16:creationId xmlns:a16="http://schemas.microsoft.com/office/drawing/2014/main" id="{3B281FEE-A482-42EE-B76B-E8CFF0FDD888}"/>
+              </a:ext>
+            </a:extLst>
+          </p:cNvPr>
+          <p:cNvSpPr txBox="1"/>
+          <p:nvPr/>
+        </p:nvSpPr>
+        <p:spPr>
+          <a:xfrm>
+            <a:off x="6458741" y="3503776"/>
+            <a:ext cx="5239481" cy="861774"/>
+          </a:xfrm>
+          <a:prstGeom prst="rect">
+            <a:avLst/>
+          </a:prstGeom>
+          <a:noFill/>
+        </p:spPr>
+        <p:txBody>
+          <a:bodyPr wrap="square" rtlCol="0">
+            <a:spAutoFit/>
+          </a:bodyPr>
+          <a:lstStyle/>
+          <a:p>
+            <a:r>
+              <a:rPr lang="en-IN" sz="1000" dirty="0">
+                <a:latin typeface="Century Gothic" panose="020B0502020202020204" pitchFamily="34" charset="0"/>
+              </a:rPr>
+              <a:t>Lets assume that we are planning to select 6 length because it is solving our problem for now. </a:t>
+            </a:r>
+          </a:p>
+          <a:p>
+            <a:endParaRPr lang="en-IN" sz="1000">
+              <a:latin typeface="Century Gothic" panose="020B0502020202020204" pitchFamily="34" charset="0"/>
+            </a:endParaRPr>
+          </a:p>
+          <a:p>
+            <a:endParaRPr lang="en-IN" sz="1000">
+              <a:latin typeface="Century Gothic" panose="020B0502020202020204" pitchFamily="34" charset="0"/>
+            </a:endParaRPr>
+          </a:p>
+          <a:p>
+            <a:endParaRPr lang="en-IN" sz="1000" dirty="0">
+              <a:latin typeface="Century Gothic" panose="020B0502020202020204" pitchFamily="34" charset="0"/>
+            </a:endParaRPr>
           </a:p>
         </p:txBody>
       </p:sp>

</xml_diff>